<commit_message>
Need to update again
</commit_message>
<xml_diff>
--- a/docs/diagrams/ModelComponentClassDiagram.pptx
+++ b/docs/diagrams/ModelComponentClassDiagram.pptx
@@ -208,7 +208,7 @@
           <a:p>
             <a:fld id="{F5CC4B3F-88C1-4FFA-B1B6-F41C21DC6924}" type="datetimeFigureOut">
               <a:rPr lang="en-US" smtClean="0"/>
-              <a:t>9/4/17</a:t>
+              <a:t>10/19/17</a:t>
             </a:fld>
             <a:endParaRPr lang="en-US"/>
           </a:p>
@@ -657,7 +657,7 @@
           <a:p>
             <a:fld id="{78C97017-6FC3-485B-9764-EAC9E56C1D49}" type="datetimeFigureOut">
               <a:rPr lang="en-US" smtClean="0"/>
-              <a:t>9/4/17</a:t>
+              <a:t>10/19/17</a:t>
             </a:fld>
             <a:endParaRPr lang="en-US"/>
           </a:p>
@@ -827,7 +827,7 @@
           <a:p>
             <a:fld id="{78C97017-6FC3-485B-9764-EAC9E56C1D49}" type="datetimeFigureOut">
               <a:rPr lang="en-US" smtClean="0"/>
-              <a:t>9/4/17</a:t>
+              <a:t>10/19/17</a:t>
             </a:fld>
             <a:endParaRPr lang="en-US"/>
           </a:p>
@@ -1007,7 +1007,7 @@
           <a:p>
             <a:fld id="{78C97017-6FC3-485B-9764-EAC9E56C1D49}" type="datetimeFigureOut">
               <a:rPr lang="en-US" smtClean="0"/>
-              <a:t>9/4/17</a:t>
+              <a:t>10/19/17</a:t>
             </a:fld>
             <a:endParaRPr lang="en-US"/>
           </a:p>
@@ -1177,7 +1177,7 @@
           <a:p>
             <a:fld id="{78C97017-6FC3-485B-9764-EAC9E56C1D49}" type="datetimeFigureOut">
               <a:rPr lang="en-US" smtClean="0"/>
-              <a:t>9/4/17</a:t>
+              <a:t>10/19/17</a:t>
             </a:fld>
             <a:endParaRPr lang="en-US"/>
           </a:p>
@@ -1423,7 +1423,7 @@
           <a:p>
             <a:fld id="{78C97017-6FC3-485B-9764-EAC9E56C1D49}" type="datetimeFigureOut">
               <a:rPr lang="en-US" smtClean="0"/>
-              <a:t>9/4/17</a:t>
+              <a:t>10/19/17</a:t>
             </a:fld>
             <a:endParaRPr lang="en-US"/>
           </a:p>
@@ -1711,7 +1711,7 @@
           <a:p>
             <a:fld id="{78C97017-6FC3-485B-9764-EAC9E56C1D49}" type="datetimeFigureOut">
               <a:rPr lang="en-US" smtClean="0"/>
-              <a:t>9/4/17</a:t>
+              <a:t>10/19/17</a:t>
             </a:fld>
             <a:endParaRPr lang="en-US"/>
           </a:p>
@@ -2133,7 +2133,7 @@
           <a:p>
             <a:fld id="{78C97017-6FC3-485B-9764-EAC9E56C1D49}" type="datetimeFigureOut">
               <a:rPr lang="en-US" smtClean="0"/>
-              <a:t>9/4/17</a:t>
+              <a:t>10/19/17</a:t>
             </a:fld>
             <a:endParaRPr lang="en-US"/>
           </a:p>
@@ -2251,7 +2251,7 @@
           <a:p>
             <a:fld id="{78C97017-6FC3-485B-9764-EAC9E56C1D49}" type="datetimeFigureOut">
               <a:rPr lang="en-US" smtClean="0"/>
-              <a:t>9/4/17</a:t>
+              <a:t>10/19/17</a:t>
             </a:fld>
             <a:endParaRPr lang="en-US"/>
           </a:p>
@@ -2346,7 +2346,7 @@
           <a:p>
             <a:fld id="{78C97017-6FC3-485B-9764-EAC9E56C1D49}" type="datetimeFigureOut">
               <a:rPr lang="en-US" smtClean="0"/>
-              <a:t>9/4/17</a:t>
+              <a:t>10/19/17</a:t>
             </a:fld>
             <a:endParaRPr lang="en-US"/>
           </a:p>
@@ -2623,7 +2623,7 @@
           <a:p>
             <a:fld id="{78C97017-6FC3-485B-9764-EAC9E56C1D49}" type="datetimeFigureOut">
               <a:rPr lang="en-US" smtClean="0"/>
-              <a:t>9/4/17</a:t>
+              <a:t>10/19/17</a:t>
             </a:fld>
             <a:endParaRPr lang="en-US"/>
           </a:p>
@@ -2876,7 +2876,7 @@
           <a:p>
             <a:fld id="{78C97017-6FC3-485B-9764-EAC9E56C1D49}" type="datetimeFigureOut">
               <a:rPr lang="en-US" smtClean="0"/>
-              <a:t>9/4/17</a:t>
+              <a:t>10/19/17</a:t>
             </a:fld>
             <a:endParaRPr lang="en-US"/>
           </a:p>
@@ -3089,7 +3089,7 @@
           <a:p>
             <a:fld id="{78C97017-6FC3-485B-9764-EAC9E56C1D49}" type="datetimeFigureOut">
               <a:rPr lang="en-US" smtClean="0"/>
-              <a:t>9/4/17</a:t>
+              <a:t>10/19/17</a:t>
             </a:fld>
             <a:endParaRPr lang="en-US"/>
           </a:p>
@@ -3533,7 +3533,7 @@
         </p:nvSpPr>
         <p:spPr>
           <a:xfrm>
-            <a:off x="2877180" y="3158440"/>
+            <a:off x="2118214" y="3548394"/>
             <a:ext cx="1093635" cy="346760"/>
           </a:xfrm>
           <a:prstGeom prst="rect">
@@ -3584,65 +3584,6 @@
           </a:p>
         </p:txBody>
       </p:sp>
-      <p:sp>
-        <p:nvSpPr>
-          <p:cNvPr id="9" name="Rectangle 62"/>
-          <p:cNvSpPr/>
-          <p:nvPr/>
-        </p:nvSpPr>
-        <p:spPr>
-          <a:xfrm rot="16200000">
-            <a:off x="1683963" y="2868687"/>
-            <a:ext cx="1093635" cy="346760"/>
-          </a:xfrm>
-          <a:prstGeom prst="rect">
-            <a:avLst/>
-          </a:prstGeom>
-          <a:solidFill>
-            <a:srgbClr val="7030A0"/>
-          </a:solidFill>
-          <a:ln w="19050">
-            <a:solidFill>
-              <a:srgbClr val="7030A0"/>
-            </a:solidFill>
-          </a:ln>
-          <a:effectLst/>
-        </p:spPr>
-        <p:style>
-          <a:lnRef idx="1">
-            <a:schemeClr val="accent2"/>
-          </a:lnRef>
-          <a:fillRef idx="2">
-            <a:schemeClr val="accent2"/>
-          </a:fillRef>
-          <a:effectRef idx="1">
-            <a:schemeClr val="accent2"/>
-          </a:effectRef>
-          <a:fontRef idx="minor">
-            <a:schemeClr val="dk1"/>
-          </a:fontRef>
-        </p:style>
-        <p:txBody>
-          <a:bodyPr rtlCol="0" anchor="ctr"/>
-          <a:lstStyle/>
-          <a:p>
-            <a:pPr algn="ctr"/>
-            <a:r>
-              <a:rPr lang="en-US" sz="1050" dirty="0" err="1" smtClean="0">
-                <a:solidFill>
-                  <a:schemeClr val="bg1"/>
-                </a:solidFill>
-              </a:rPr>
-              <a:t>ModelManager</a:t>
-            </a:r>
-            <a:endParaRPr lang="en-SG" sz="1050" dirty="0">
-              <a:solidFill>
-                <a:schemeClr val="bg1"/>
-              </a:solidFill>
-            </a:endParaRPr>
-          </a:p>
-        </p:txBody>
-      </p:sp>
       <p:cxnSp>
         <p:nvCxnSpPr>
           <p:cNvPr id="53" name="Elbow Connector 63"/>
@@ -3653,7 +3594,7 @@
         </p:nvCxnSpPr>
         <p:spPr>
           <a:xfrm flipV="1">
-            <a:off x="6477000" y="3194131"/>
+            <a:off x="5718034" y="3584085"/>
             <a:ext cx="95385" cy="416514"/>
           </a:xfrm>
           <a:prstGeom prst="bentConnector2">
@@ -3686,28 +3627,25 @@
       </p:cxnSp>
       <p:cxnSp>
         <p:nvCxnSpPr>
-          <p:cNvPr id="107" name="Elbow Connector 106"/>
+          <p:cNvPr id="58" name="Straight Arrow Connector 57"/>
           <p:cNvCxnSpPr>
-            <a:stCxn id="9" idx="1"/>
+            <a:stCxn id="42" idx="3"/>
+            <a:endCxn id="2" idx="1"/>
           </p:cNvCxnSpPr>
           <p:nvPr/>
         </p:nvCxnSpPr>
         <p:spPr>
-          <a:xfrm rot="5400000" flipH="1" flipV="1">
-            <a:off x="4360065" y="1080909"/>
-            <a:ext cx="378691" cy="4637261"/>
-          </a:xfrm>
-          <a:prstGeom prst="bentConnector4">
-            <a:avLst>
-              <a:gd name="adj1" fmla="val -101829"/>
-              <a:gd name="adj2" fmla="val 99976"/>
-            </a:avLst>
+          <a:xfrm>
+            <a:off x="1897404" y="3716490"/>
+            <a:ext cx="220810" cy="5284"/>
+          </a:xfrm>
+          <a:prstGeom prst="straightConnector1">
+            <a:avLst/>
           </a:prstGeom>
           <a:ln w="19050">
             <a:solidFill>
               <a:srgbClr val="7030A0"/>
             </a:solidFill>
-            <a:prstDash val="solid"/>
             <a:headEnd type="none" w="med" len="med"/>
             <a:tailEnd type="arrow" w="med" len="med"/>
           </a:ln>
@@ -3730,16 +3668,16 @@
       </p:cxnSp>
       <p:sp>
         <p:nvSpPr>
-          <p:cNvPr id="119" name="Rectangle 62"/>
+          <p:cNvPr id="71" name="Isosceles Triangle 102"/>
           <p:cNvSpPr/>
           <p:nvPr/>
         </p:nvSpPr>
         <p:spPr>
-          <a:xfrm rot="16200000">
-            <a:off x="956202" y="2861202"/>
-            <a:ext cx="1093635" cy="346760"/>
-          </a:xfrm>
-          <a:prstGeom prst="rect">
+          <a:xfrm rot="5400000" flipV="1">
+            <a:off x="5495020" y="3912837"/>
+            <a:ext cx="270504" cy="175523"/>
+          </a:xfrm>
+          <a:prstGeom prst="triangle">
             <a:avLst/>
           </a:prstGeom>
           <a:solidFill>
@@ -3754,13 +3692,13 @@
         </p:spPr>
         <p:style>
           <a:lnRef idx="1">
-            <a:schemeClr val="accent2"/>
+            <a:schemeClr val="accent4"/>
           </a:lnRef>
           <a:fillRef idx="2">
-            <a:schemeClr val="accent2"/>
+            <a:schemeClr val="accent4"/>
           </a:fillRef>
           <a:effectRef idx="1">
-            <a:schemeClr val="accent2"/>
+            <a:schemeClr val="accent4"/>
           </a:effectRef>
           <a:fontRef idx="minor">
             <a:schemeClr val="dk1"/>
@@ -3771,28 +3709,9 @@
           <a:lstStyle/>
           <a:p>
             <a:pPr algn="ctr"/>
-            <a:r>
-              <a:rPr lang="en-US" sz="1050" dirty="0">
-                <a:solidFill>
-                  <a:schemeClr val="bg1"/>
-                </a:solidFill>
-              </a:rPr>
-              <a:t>&lt;&lt;interface&gt;&gt;</a:t>
-            </a:r>
-          </a:p>
-          <a:p>
-            <a:pPr algn="ctr"/>
-            <a:r>
-              <a:rPr lang="en-US" sz="1050" dirty="0" smtClean="0">
-                <a:solidFill>
-                  <a:schemeClr val="bg1"/>
-                </a:solidFill>
-              </a:rPr>
-              <a:t>Model</a:t>
-            </a:r>
-            <a:endParaRPr lang="en-SG" sz="1050" dirty="0">
+            <a:endParaRPr lang="en-SG" sz="1050" b="1">
               <a:solidFill>
-                <a:schemeClr val="bg1"/>
+                <a:srgbClr val="92D050"/>
               </a:solidFill>
             </a:endParaRPr>
           </a:p>
@@ -3800,21 +3719,19 @@
       </p:sp>
       <p:sp>
         <p:nvSpPr>
-          <p:cNvPr id="120" name="Isosceles Triangle 102"/>
+          <p:cNvPr id="42" name="Flowchart: Decision 96"/>
           <p:cNvSpPr/>
           <p:nvPr/>
         </p:nvSpPr>
         <p:spPr>
-          <a:xfrm rot="16200000">
-            <a:off x="1626910" y="2952291"/>
-            <a:ext cx="270504" cy="175523"/>
-          </a:xfrm>
-          <a:prstGeom prst="triangle">
+          <a:xfrm>
+            <a:off x="1661356" y="3629800"/>
+            <a:ext cx="236048" cy="173380"/>
+          </a:xfrm>
+          <a:prstGeom prst="flowChartDecision">
             <a:avLst/>
           </a:prstGeom>
-          <a:solidFill>
-            <a:srgbClr val="7030A0"/>
-          </a:solidFill>
+          <a:noFill/>
           <a:ln w="19050">
             <a:solidFill>
               <a:srgbClr val="7030A0"/>
@@ -3841,22 +3758,78 @@
           <a:lstStyle/>
           <a:p>
             <a:pPr algn="ctr"/>
-            <a:endParaRPr lang="en-SG" sz="1050"/>
+            <a:endParaRPr lang="en-US" sz="1050"/>
+          </a:p>
+        </p:txBody>
+      </p:sp>
+      <p:sp>
+        <p:nvSpPr>
+          <p:cNvPr id="46" name="Rectangle 8"/>
+          <p:cNvSpPr/>
+          <p:nvPr/>
+        </p:nvSpPr>
+        <p:spPr>
+          <a:xfrm>
+            <a:off x="2120524" y="3017374"/>
+            <a:ext cx="1093635" cy="346760"/>
+          </a:xfrm>
+          <a:prstGeom prst="rect">
+            <a:avLst/>
+          </a:prstGeom>
+          <a:ln w="19050">
+            <a:solidFill>
+              <a:srgbClr val="7030A0"/>
+            </a:solidFill>
+          </a:ln>
+          <a:effectLst/>
+        </p:spPr>
+        <p:style>
+          <a:lnRef idx="1">
+            <a:schemeClr val="accent4"/>
+          </a:lnRef>
+          <a:fillRef idx="2">
+            <a:schemeClr val="accent4"/>
+          </a:fillRef>
+          <a:effectRef idx="1">
+            <a:schemeClr val="accent4"/>
+          </a:effectRef>
+          <a:fontRef idx="minor">
+            <a:schemeClr val="dk1"/>
+          </a:fontRef>
+        </p:style>
+        <p:txBody>
+          <a:bodyPr rtlCol="0" anchor="ctr"/>
+          <a:lstStyle/>
+          <a:p>
+            <a:pPr algn="ctr"/>
+            <a:r>
+              <a:rPr lang="en-US" sz="1050" dirty="0" err="1" smtClean="0">
+                <a:solidFill>
+                  <a:srgbClr val="7030A0"/>
+                </a:solidFill>
+              </a:rPr>
+              <a:t>AddressBook</a:t>
+            </a:r>
+            <a:endParaRPr lang="en-SG" sz="1050" dirty="0">
+              <a:solidFill>
+                <a:srgbClr val="7030A0"/>
+              </a:solidFill>
+            </a:endParaRPr>
           </a:p>
         </p:txBody>
       </p:sp>
       <p:cxnSp>
         <p:nvCxnSpPr>
-          <p:cNvPr id="58" name="Straight Arrow Connector 57"/>
+          <p:cNvPr id="47" name="Straight Arrow Connector 46"/>
           <p:cNvCxnSpPr>
-            <a:stCxn id="42" idx="3"/>
-            <a:endCxn id="2" idx="1"/>
+            <a:stCxn id="48" idx="3"/>
+            <a:endCxn id="46" idx="1"/>
           </p:cNvCxnSpPr>
           <p:nvPr/>
         </p:nvCxnSpPr>
         <p:spPr>
           <a:xfrm>
-            <a:off x="2656370" y="3326536"/>
+            <a:off x="1899714" y="3185470"/>
             <a:ext cx="220810" cy="5284"/>
           </a:xfrm>
           <a:prstGeom prst="straightConnector1">
@@ -3888,21 +3861,63 @@
       </p:cxnSp>
       <p:sp>
         <p:nvSpPr>
-          <p:cNvPr id="71" name="Isosceles Triangle 102"/>
+          <p:cNvPr id="48" name="Flowchart: Decision 96"/>
           <p:cNvSpPr/>
           <p:nvPr/>
         </p:nvSpPr>
         <p:spPr>
-          <a:xfrm rot="5400000" flipV="1">
-            <a:off x="6253986" y="3522883"/>
-            <a:ext cx="270504" cy="175523"/>
-          </a:xfrm>
-          <a:prstGeom prst="triangle">
+          <a:xfrm>
+            <a:off x="1663666" y="3098780"/>
+            <a:ext cx="236048" cy="173380"/>
+          </a:xfrm>
+          <a:prstGeom prst="flowChartDecision">
             <a:avLst/>
           </a:prstGeom>
-          <a:solidFill>
-            <a:srgbClr val="7030A0"/>
-          </a:solidFill>
+          <a:noFill/>
+          <a:ln w="19050">
+            <a:solidFill>
+              <a:srgbClr val="7030A0"/>
+            </a:solidFill>
+          </a:ln>
+          <a:effectLst/>
+        </p:spPr>
+        <p:style>
+          <a:lnRef idx="1">
+            <a:schemeClr val="accent6"/>
+          </a:lnRef>
+          <a:fillRef idx="2">
+            <a:schemeClr val="accent6"/>
+          </a:fillRef>
+          <a:effectRef idx="1">
+            <a:schemeClr val="accent6"/>
+          </a:effectRef>
+          <a:fontRef idx="minor">
+            <a:schemeClr val="dk1"/>
+          </a:fontRef>
+        </p:style>
+        <p:txBody>
+          <a:bodyPr rtlCol="0" anchor="ctr"/>
+          <a:lstStyle/>
+          <a:p>
+            <a:pPr algn="ctr"/>
+            <a:endParaRPr lang="en-US" sz="1050"/>
+          </a:p>
+        </p:txBody>
+      </p:sp>
+      <p:sp>
+        <p:nvSpPr>
+          <p:cNvPr id="49" name="Rectangle 8"/>
+          <p:cNvSpPr/>
+          <p:nvPr/>
+        </p:nvSpPr>
+        <p:spPr>
+          <a:xfrm>
+            <a:off x="3728051" y="3237325"/>
+            <a:ext cx="1156969" cy="346760"/>
+          </a:xfrm>
+          <a:prstGeom prst="rect">
+            <a:avLst/>
+          </a:prstGeom>
           <a:ln w="19050">
             <a:solidFill>
               <a:srgbClr val="7030A0"/>
@@ -3929,37 +3944,90 @@
           <a:lstStyle/>
           <a:p>
             <a:pPr algn="ctr"/>
-            <a:endParaRPr lang="en-SG" sz="1050" b="1">
+            <a:r>
+              <a:rPr lang="en-US" sz="1050" dirty="0" err="1" smtClean="0">
+                <a:solidFill>
+                  <a:srgbClr val="7030A0"/>
+                </a:solidFill>
+              </a:rPr>
+              <a:t>UniquePersonList</a:t>
+            </a:r>
+            <a:endParaRPr lang="en-SG" sz="1050" dirty="0">
               <a:solidFill>
-                <a:srgbClr val="92D050"/>
+                <a:srgbClr val="7030A0"/>
               </a:solidFill>
             </a:endParaRPr>
           </a:p>
         </p:txBody>
       </p:sp>
+      <p:sp>
+        <p:nvSpPr>
+          <p:cNvPr id="51" name="Flowchart: Decision 96"/>
+          <p:cNvSpPr/>
+          <p:nvPr/>
+        </p:nvSpPr>
+        <p:spPr>
+          <a:xfrm>
+            <a:off x="3225337" y="3063945"/>
+            <a:ext cx="236048" cy="173380"/>
+          </a:xfrm>
+          <a:prstGeom prst="flowChartDecision">
+            <a:avLst/>
+          </a:prstGeom>
+          <a:solidFill>
+            <a:srgbClr val="7030A0"/>
+          </a:solidFill>
+          <a:ln w="19050">
+            <a:solidFill>
+              <a:srgbClr val="7030A0"/>
+            </a:solidFill>
+          </a:ln>
+          <a:effectLst/>
+        </p:spPr>
+        <p:style>
+          <a:lnRef idx="1">
+            <a:schemeClr val="accent6"/>
+          </a:lnRef>
+          <a:fillRef idx="2">
+            <a:schemeClr val="accent6"/>
+          </a:fillRef>
+          <a:effectRef idx="1">
+            <a:schemeClr val="accent6"/>
+          </a:effectRef>
+          <a:fontRef idx="minor">
+            <a:schemeClr val="dk1"/>
+          </a:fontRef>
+        </p:style>
+        <p:txBody>
+          <a:bodyPr rtlCol="0" anchor="ctr"/>
+          <a:lstStyle/>
+          <a:p>
+            <a:pPr algn="ctr"/>
+            <a:endParaRPr lang="en-US" sz="1050"/>
+          </a:p>
+        </p:txBody>
+      </p:sp>
       <p:cxnSp>
         <p:nvCxnSpPr>
-          <p:cNvPr id="75" name="Elbow Connector 122"/>
-          <p:cNvCxnSpPr/>
+          <p:cNvPr id="30" name="Elbow Connector 29"/>
+          <p:cNvCxnSpPr>
+            <a:stCxn id="51" idx="3"/>
+            <a:endCxn id="49" idx="1"/>
+          </p:cNvCxnSpPr>
           <p:nvPr/>
         </p:nvCxnSpPr>
         <p:spPr>
           <a:xfrm>
-            <a:off x="910091" y="3040053"/>
-            <a:ext cx="419548" cy="2860"/>
+            <a:off x="3461385" y="3150635"/>
+            <a:ext cx="266666" cy="260070"/>
           </a:xfrm>
           <a:prstGeom prst="bentConnector3">
-            <a:avLst>
-              <a:gd name="adj1" fmla="val 50000"/>
-            </a:avLst>
+            <a:avLst/>
           </a:prstGeom>
           <a:ln w="19050">
             <a:solidFill>
-              <a:schemeClr val="bg1">
-                <a:lumMod val="75000"/>
-              </a:schemeClr>
+              <a:srgbClr val="7030A0"/>
             </a:solidFill>
-            <a:prstDash val="sysDot"/>
             <a:headEnd type="none" w="med" len="med"/>
             <a:tailEnd type="arrow" w="med" len="med"/>
           </a:ln>
@@ -3980,29 +4048,87 @@
           </a:fontRef>
         </p:style>
       </p:cxnSp>
-      <p:cxnSp>
-        <p:nvCxnSpPr>
-          <p:cNvPr id="21" name="Straight Connector 20"/>
-          <p:cNvCxnSpPr>
-            <a:stCxn id="120" idx="3"/>
-          </p:cNvCxnSpPr>
+      <p:sp>
+        <p:nvSpPr>
+          <p:cNvPr id="57" name="Rectangle 8"/>
+          <p:cNvSpPr/>
           <p:nvPr/>
-        </p:nvCxnSpPr>
-        <p:spPr>
-          <a:xfrm flipV="1">
-            <a:off x="1849924" y="3040052"/>
-            <a:ext cx="216105" cy="1"/>
-          </a:xfrm>
-          <a:prstGeom prst="line">
+        </p:nvSpPr>
+        <p:spPr>
+          <a:xfrm>
+            <a:off x="3718362" y="2670523"/>
+            <a:ext cx="1156969" cy="346760"/>
+          </a:xfrm>
+          <a:prstGeom prst="rect">
             <a:avLst/>
           </a:prstGeom>
           <a:ln w="19050">
             <a:solidFill>
               <a:srgbClr val="7030A0"/>
             </a:solidFill>
-            <a:prstDash val="sysDot"/>
+          </a:ln>
+          <a:effectLst/>
+        </p:spPr>
+        <p:style>
+          <a:lnRef idx="1">
+            <a:schemeClr val="accent4"/>
+          </a:lnRef>
+          <a:fillRef idx="2">
+            <a:schemeClr val="accent4"/>
+          </a:fillRef>
+          <a:effectRef idx="1">
+            <a:schemeClr val="accent4"/>
+          </a:effectRef>
+          <a:fontRef idx="minor">
+            <a:schemeClr val="dk1"/>
+          </a:fontRef>
+        </p:style>
+        <p:txBody>
+          <a:bodyPr rtlCol="0" anchor="ctr"/>
+          <a:lstStyle/>
+          <a:p>
+            <a:pPr algn="ctr"/>
+            <a:r>
+              <a:rPr lang="en-US" sz="1050" dirty="0" err="1" smtClean="0">
+                <a:solidFill>
+                  <a:srgbClr val="7030A0"/>
+                </a:solidFill>
+              </a:rPr>
+              <a:t>UniqueTagList</a:t>
+            </a:r>
+            <a:endParaRPr lang="en-SG" sz="1050" dirty="0">
+              <a:solidFill>
+                <a:srgbClr val="7030A0"/>
+              </a:solidFill>
+            </a:endParaRPr>
+          </a:p>
+        </p:txBody>
+      </p:sp>
+      <p:cxnSp>
+        <p:nvCxnSpPr>
+          <p:cNvPr id="59" name="Elbow Connector 58"/>
+          <p:cNvCxnSpPr>
+            <a:stCxn id="51" idx="3"/>
+            <a:endCxn id="57" idx="1"/>
+          </p:cNvCxnSpPr>
+          <p:nvPr/>
+        </p:nvCxnSpPr>
+        <p:spPr>
+          <a:xfrm flipV="1">
+            <a:off x="3461385" y="2843903"/>
+            <a:ext cx="256977" cy="306732"/>
+          </a:xfrm>
+          <a:prstGeom prst="bentConnector3">
+            <a:avLst>
+              <a:gd name="adj1" fmla="val 50000"/>
+            </a:avLst>
+          </a:prstGeom>
+          <a:ln w="19050">
+            <a:solidFill>
+              <a:srgbClr val="7030A0"/>
+            </a:solidFill>
             <a:headEnd type="none" w="med" len="med"/>
-            <a:tailEnd type="none" w="med" len="med"/>
+            <a:tailEnd type="arrow" w="med" len="med"/>
           </a:ln>
           <a:effectLst/>
         </p:spPr>
@@ -4023,13 +4149,69 @@
       </p:cxnSp>
       <p:sp>
         <p:nvSpPr>
-          <p:cNvPr id="42" name="Flowchart: Decision 96"/>
+          <p:cNvPr id="62" name="Rectangle 8"/>
           <p:cNvSpPr/>
           <p:nvPr/>
         </p:nvSpPr>
         <p:spPr>
           <a:xfrm>
-            <a:off x="2420322" y="3239846"/>
+            <a:off x="5554711" y="3248020"/>
+            <a:ext cx="708186" cy="346760"/>
+          </a:xfrm>
+          <a:prstGeom prst="rect">
+            <a:avLst/>
+          </a:prstGeom>
+          <a:ln w="19050">
+            <a:solidFill>
+              <a:srgbClr val="7030A0"/>
+            </a:solidFill>
+          </a:ln>
+          <a:effectLst/>
+        </p:spPr>
+        <p:style>
+          <a:lnRef idx="1">
+            <a:schemeClr val="accent4"/>
+          </a:lnRef>
+          <a:fillRef idx="2">
+            <a:schemeClr val="accent4"/>
+          </a:fillRef>
+          <a:effectRef idx="1">
+            <a:schemeClr val="accent4"/>
+          </a:effectRef>
+          <a:fontRef idx="minor">
+            <a:schemeClr val="dk1"/>
+          </a:fontRef>
+        </p:style>
+        <p:txBody>
+          <a:bodyPr rtlCol="0" anchor="ctr"/>
+          <a:lstStyle/>
+          <a:p>
+            <a:pPr algn="ctr"/>
+            <a:r>
+              <a:rPr lang="en-US" sz="1050" dirty="0" smtClean="0">
+                <a:solidFill>
+                  <a:srgbClr val="7030A0"/>
+                </a:solidFill>
+              </a:rPr>
+              <a:t>Person</a:t>
+            </a:r>
+            <a:endParaRPr lang="en-SG" sz="1050" dirty="0">
+              <a:solidFill>
+                <a:srgbClr val="7030A0"/>
+              </a:solidFill>
+            </a:endParaRPr>
+          </a:p>
+        </p:txBody>
+      </p:sp>
+      <p:sp>
+        <p:nvSpPr>
+          <p:cNvPr id="63" name="Flowchart: Decision 96"/>
+          <p:cNvSpPr/>
+          <p:nvPr/>
+        </p:nvSpPr>
+        <p:spPr>
+          <a:xfrm>
+            <a:off x="4884261" y="3333933"/>
             <a:ext cx="236048" cy="173380"/>
           </a:xfrm>
           <a:prstGeom prst="flowChartDecision">
@@ -4066,77 +4248,21 @@
           </a:p>
         </p:txBody>
       </p:sp>
-      <p:sp>
-        <p:nvSpPr>
-          <p:cNvPr id="46" name="Rectangle 8"/>
-          <p:cNvSpPr/>
-          <p:nvPr/>
-        </p:nvSpPr>
-        <p:spPr>
-          <a:xfrm>
-            <a:off x="2879490" y="2627420"/>
-            <a:ext cx="1093635" cy="346760"/>
-          </a:xfrm>
-          <a:prstGeom prst="rect">
-            <a:avLst/>
-          </a:prstGeom>
-          <a:ln w="19050">
-            <a:solidFill>
-              <a:srgbClr val="7030A0"/>
-            </a:solidFill>
-          </a:ln>
-          <a:effectLst/>
-        </p:spPr>
-        <p:style>
-          <a:lnRef idx="1">
-            <a:schemeClr val="accent4"/>
-          </a:lnRef>
-          <a:fillRef idx="2">
-            <a:schemeClr val="accent4"/>
-          </a:fillRef>
-          <a:effectRef idx="1">
-            <a:schemeClr val="accent4"/>
-          </a:effectRef>
-          <a:fontRef idx="minor">
-            <a:schemeClr val="dk1"/>
-          </a:fontRef>
-        </p:style>
-        <p:txBody>
-          <a:bodyPr rtlCol="0" anchor="ctr"/>
-          <a:lstStyle/>
-          <a:p>
-            <a:pPr algn="ctr"/>
-            <a:r>
-              <a:rPr lang="en-US" sz="1050" dirty="0" err="1" smtClean="0">
-                <a:solidFill>
-                  <a:srgbClr val="7030A0"/>
-                </a:solidFill>
-              </a:rPr>
-              <a:t>AddressBook</a:t>
-            </a:r>
-            <a:endParaRPr lang="en-SG" sz="1050" dirty="0">
-              <a:solidFill>
-                <a:srgbClr val="7030A0"/>
-              </a:solidFill>
-            </a:endParaRPr>
-          </a:p>
-        </p:txBody>
-      </p:sp>
       <p:cxnSp>
         <p:nvCxnSpPr>
-          <p:cNvPr id="47" name="Straight Arrow Connector 46"/>
+          <p:cNvPr id="64" name="Elbow Connector 63"/>
           <p:cNvCxnSpPr>
-            <a:stCxn id="48" idx="3"/>
-            <a:endCxn id="46" idx="1"/>
+            <a:stCxn id="63" idx="3"/>
+            <a:endCxn id="62" idx="1"/>
           </p:cNvCxnSpPr>
           <p:nvPr/>
         </p:nvCxnSpPr>
         <p:spPr>
           <a:xfrm>
-            <a:off x="2658680" y="2795516"/>
-            <a:ext cx="220810" cy="5284"/>
-          </a:xfrm>
-          <a:prstGeom prst="straightConnector1">
+            <a:off x="5120309" y="3420623"/>
+            <a:ext cx="434402" cy="777"/>
+          </a:xfrm>
+          <a:prstGeom prst="bentConnector3">
             <a:avLst/>
           </a:prstGeom>
           <a:ln w="19050">
@@ -4165,13 +4291,69 @@
       </p:cxnSp>
       <p:sp>
         <p:nvSpPr>
-          <p:cNvPr id="48" name="Flowchart: Decision 96"/>
+          <p:cNvPr id="67" name="Rectangle 8"/>
           <p:cNvSpPr/>
           <p:nvPr/>
         </p:nvSpPr>
         <p:spPr>
           <a:xfrm>
-            <a:off x="2422632" y="2708826"/>
+            <a:off x="4577139" y="2199286"/>
+            <a:ext cx="483700" cy="346760"/>
+          </a:xfrm>
+          <a:prstGeom prst="rect">
+            <a:avLst/>
+          </a:prstGeom>
+          <a:ln w="19050">
+            <a:solidFill>
+              <a:srgbClr val="7030A0"/>
+            </a:solidFill>
+          </a:ln>
+          <a:effectLst/>
+        </p:spPr>
+        <p:style>
+          <a:lnRef idx="1">
+            <a:schemeClr val="accent4"/>
+          </a:lnRef>
+          <a:fillRef idx="2">
+            <a:schemeClr val="accent4"/>
+          </a:fillRef>
+          <a:effectRef idx="1">
+            <a:schemeClr val="accent4"/>
+          </a:effectRef>
+          <a:fontRef idx="minor">
+            <a:schemeClr val="dk1"/>
+          </a:fontRef>
+        </p:style>
+        <p:txBody>
+          <a:bodyPr rtlCol="0" anchor="ctr"/>
+          <a:lstStyle/>
+          <a:p>
+            <a:pPr algn="ctr"/>
+            <a:r>
+              <a:rPr lang="en-US" sz="1050" dirty="0" smtClean="0">
+                <a:solidFill>
+                  <a:srgbClr val="7030A0"/>
+                </a:solidFill>
+              </a:rPr>
+              <a:t>Tag</a:t>
+            </a:r>
+            <a:endParaRPr lang="en-SG" sz="1050" dirty="0">
+              <a:solidFill>
+                <a:srgbClr val="7030A0"/>
+              </a:solidFill>
+            </a:endParaRPr>
+          </a:p>
+        </p:txBody>
+      </p:sp>
+      <p:sp>
+        <p:nvSpPr>
+          <p:cNvPr id="68" name="Flowchart: Decision 96"/>
+          <p:cNvSpPr/>
+          <p:nvPr/>
+        </p:nvSpPr>
+        <p:spPr>
+          <a:xfrm rot="16200000">
+            <a:off x="4162700" y="2456494"/>
             <a:ext cx="236048" cy="173380"/>
           </a:xfrm>
           <a:prstGeom prst="flowChartDecision">
@@ -4208,124 +4390,21 @@
           </a:p>
         </p:txBody>
       </p:sp>
-      <p:sp>
-        <p:nvSpPr>
-          <p:cNvPr id="49" name="Rectangle 8"/>
-          <p:cNvSpPr/>
-          <p:nvPr/>
-        </p:nvSpPr>
-        <p:spPr>
-          <a:xfrm>
-            <a:off x="4487017" y="2847371"/>
-            <a:ext cx="1156969" cy="346760"/>
-          </a:xfrm>
-          <a:prstGeom prst="rect">
-            <a:avLst/>
-          </a:prstGeom>
-          <a:ln w="19050">
-            <a:solidFill>
-              <a:srgbClr val="7030A0"/>
-            </a:solidFill>
-          </a:ln>
-          <a:effectLst/>
-        </p:spPr>
-        <p:style>
-          <a:lnRef idx="1">
-            <a:schemeClr val="accent4"/>
-          </a:lnRef>
-          <a:fillRef idx="2">
-            <a:schemeClr val="accent4"/>
-          </a:fillRef>
-          <a:effectRef idx="1">
-            <a:schemeClr val="accent4"/>
-          </a:effectRef>
-          <a:fontRef idx="minor">
-            <a:schemeClr val="dk1"/>
-          </a:fontRef>
-        </p:style>
-        <p:txBody>
-          <a:bodyPr rtlCol="0" anchor="ctr"/>
-          <a:lstStyle/>
-          <a:p>
-            <a:pPr algn="ctr"/>
-            <a:r>
-              <a:rPr lang="en-US" sz="1050" dirty="0" err="1" smtClean="0">
-                <a:solidFill>
-                  <a:srgbClr val="7030A0"/>
-                </a:solidFill>
-              </a:rPr>
-              <a:t>UniquePersonList</a:t>
-            </a:r>
-            <a:endParaRPr lang="en-SG" sz="1050" dirty="0">
-              <a:solidFill>
-                <a:srgbClr val="7030A0"/>
-              </a:solidFill>
-            </a:endParaRPr>
-          </a:p>
-        </p:txBody>
-      </p:sp>
-      <p:sp>
-        <p:nvSpPr>
-          <p:cNvPr id="51" name="Flowchart: Decision 96"/>
-          <p:cNvSpPr/>
-          <p:nvPr/>
-        </p:nvSpPr>
-        <p:spPr>
-          <a:xfrm>
-            <a:off x="3984303" y="2673991"/>
-            <a:ext cx="236048" cy="173380"/>
-          </a:xfrm>
-          <a:prstGeom prst="flowChartDecision">
-            <a:avLst/>
-          </a:prstGeom>
-          <a:solidFill>
-            <a:srgbClr val="7030A0"/>
-          </a:solidFill>
-          <a:ln w="19050">
-            <a:solidFill>
-              <a:srgbClr val="7030A0"/>
-            </a:solidFill>
-          </a:ln>
-          <a:effectLst/>
-        </p:spPr>
-        <p:style>
-          <a:lnRef idx="1">
-            <a:schemeClr val="accent6"/>
-          </a:lnRef>
-          <a:fillRef idx="2">
-            <a:schemeClr val="accent6"/>
-          </a:fillRef>
-          <a:effectRef idx="1">
-            <a:schemeClr val="accent6"/>
-          </a:effectRef>
-          <a:fontRef idx="minor">
-            <a:schemeClr val="dk1"/>
-          </a:fontRef>
-        </p:style>
-        <p:txBody>
-          <a:bodyPr rtlCol="0" anchor="ctr"/>
-          <a:lstStyle/>
-          <a:p>
-            <a:pPr algn="ctr"/>
-            <a:endParaRPr lang="en-US" sz="1050"/>
-          </a:p>
-        </p:txBody>
-      </p:sp>
       <p:cxnSp>
         <p:nvCxnSpPr>
-          <p:cNvPr id="30" name="Elbow Connector 29"/>
+          <p:cNvPr id="69" name="Elbow Connector 68"/>
           <p:cNvCxnSpPr>
-            <a:stCxn id="51" idx="3"/>
-            <a:endCxn id="49" idx="1"/>
+            <a:stCxn id="68" idx="3"/>
+            <a:endCxn id="67" idx="1"/>
           </p:cNvCxnSpPr>
           <p:nvPr/>
         </p:nvCxnSpPr>
         <p:spPr>
-          <a:xfrm>
-            <a:off x="4220351" y="2760681"/>
-            <a:ext cx="266666" cy="260070"/>
-          </a:xfrm>
-          <a:prstGeom prst="bentConnector3">
+          <a:xfrm rot="5400000" flipH="1" flipV="1">
+            <a:off x="4402684" y="2250706"/>
+            <a:ext cx="52494" cy="296415"/>
+          </a:xfrm>
+          <a:prstGeom prst="bentConnector2">
             <a:avLst/>
           </a:prstGeom>
           <a:ln w="19050">
@@ -4354,13 +4433,13 @@
       </p:cxnSp>
       <p:sp>
         <p:nvSpPr>
-          <p:cNvPr id="57" name="Rectangle 8"/>
+          <p:cNvPr id="72" name="Rectangle 8"/>
           <p:cNvSpPr/>
           <p:nvPr/>
         </p:nvSpPr>
         <p:spPr>
           <a:xfrm>
-            <a:off x="4477328" y="2280569"/>
+            <a:off x="4369291" y="3818954"/>
             <a:ext cx="1156969" cy="346760"/>
           </a:xfrm>
           <a:prstGeom prst="rect">
@@ -4393,12 +4472,27 @@
           <a:p>
             <a:pPr algn="ctr"/>
             <a:r>
+              <a:rPr lang="en-US" sz="1050" dirty="0" smtClean="0">
+                <a:solidFill>
+                  <a:srgbClr val="7030A0"/>
+                </a:solidFill>
+              </a:rPr>
+              <a:t>&lt;&lt;interface&gt;&gt;</a:t>
+            </a:r>
+            <a:br>
+              <a:rPr lang="en-US" sz="1050" dirty="0" smtClean="0">
+                <a:solidFill>
+                  <a:srgbClr val="7030A0"/>
+                </a:solidFill>
+              </a:rPr>
+            </a:br>
+            <a:r>
               <a:rPr lang="en-US" sz="1050" dirty="0" err="1" smtClean="0">
                 <a:solidFill>
                   <a:srgbClr val="7030A0"/>
                 </a:solidFill>
               </a:rPr>
-              <a:t>UniqueTagList</a:t>
+              <a:t>ReadOnlyPerson</a:t>
             </a:r>
             <a:endParaRPr lang="en-SG" sz="1050" dirty="0">
               <a:solidFill>
@@ -4408,24 +4502,125 @@
           </a:p>
         </p:txBody>
       </p:sp>
+      <p:sp>
+        <p:nvSpPr>
+          <p:cNvPr id="76" name="Rectangle 8"/>
+          <p:cNvSpPr/>
+          <p:nvPr/>
+        </p:nvSpPr>
+        <p:spPr>
+          <a:xfrm>
+            <a:off x="7712397" y="2564238"/>
+            <a:ext cx="708186" cy="285783"/>
+          </a:xfrm>
+          <a:prstGeom prst="rect">
+            <a:avLst/>
+          </a:prstGeom>
+          <a:ln w="19050">
+            <a:solidFill>
+              <a:srgbClr val="7030A0"/>
+            </a:solidFill>
+          </a:ln>
+          <a:effectLst/>
+        </p:spPr>
+        <p:style>
+          <a:lnRef idx="1">
+            <a:schemeClr val="accent4"/>
+          </a:lnRef>
+          <a:fillRef idx="2">
+            <a:schemeClr val="accent4"/>
+          </a:fillRef>
+          <a:effectRef idx="1">
+            <a:schemeClr val="accent4"/>
+          </a:effectRef>
+          <a:fontRef idx="minor">
+            <a:schemeClr val="dk1"/>
+          </a:fontRef>
+        </p:style>
+        <p:txBody>
+          <a:bodyPr rtlCol="0" anchor="ctr"/>
+          <a:lstStyle/>
+          <a:p>
+            <a:pPr algn="ctr"/>
+            <a:r>
+              <a:rPr lang="en-US" sz="1050" dirty="0" smtClean="0">
+                <a:solidFill>
+                  <a:srgbClr val="7030A0"/>
+                </a:solidFill>
+              </a:rPr>
+              <a:t>Name</a:t>
+            </a:r>
+            <a:endParaRPr lang="en-SG" sz="1050" dirty="0">
+              <a:solidFill>
+                <a:srgbClr val="7030A0"/>
+              </a:solidFill>
+            </a:endParaRPr>
+          </a:p>
+        </p:txBody>
+      </p:sp>
+      <p:sp>
+        <p:nvSpPr>
+          <p:cNvPr id="78" name="Flowchart: Decision 96"/>
+          <p:cNvSpPr/>
+          <p:nvPr/>
+        </p:nvSpPr>
+        <p:spPr>
+          <a:xfrm>
+            <a:off x="6282981" y="3338155"/>
+            <a:ext cx="236048" cy="173380"/>
+          </a:xfrm>
+          <a:prstGeom prst="flowChartDecision">
+            <a:avLst/>
+          </a:prstGeom>
+          <a:solidFill>
+            <a:srgbClr val="7030A0"/>
+          </a:solidFill>
+          <a:ln w="19050">
+            <a:solidFill>
+              <a:srgbClr val="7030A0"/>
+            </a:solidFill>
+          </a:ln>
+          <a:effectLst/>
+        </p:spPr>
+        <p:style>
+          <a:lnRef idx="1">
+            <a:schemeClr val="accent6"/>
+          </a:lnRef>
+          <a:fillRef idx="2">
+            <a:schemeClr val="accent6"/>
+          </a:fillRef>
+          <a:effectRef idx="1">
+            <a:schemeClr val="accent6"/>
+          </a:effectRef>
+          <a:fontRef idx="minor">
+            <a:schemeClr val="dk1"/>
+          </a:fontRef>
+        </p:style>
+        <p:txBody>
+          <a:bodyPr rtlCol="0" anchor="ctr"/>
+          <a:lstStyle/>
+          <a:p>
+            <a:pPr algn="ctr"/>
+            <a:endParaRPr lang="en-US" sz="1050"/>
+          </a:p>
+        </p:txBody>
+      </p:sp>
       <p:cxnSp>
         <p:nvCxnSpPr>
-          <p:cNvPr id="59" name="Elbow Connector 58"/>
+          <p:cNvPr id="79" name="Elbow Connector 78"/>
           <p:cNvCxnSpPr>
-            <a:stCxn id="51" idx="3"/>
-            <a:endCxn id="57" idx="1"/>
+            <a:stCxn id="78" idx="3"/>
+            <a:endCxn id="76" idx="1"/>
           </p:cNvCxnSpPr>
           <p:nvPr/>
         </p:nvCxnSpPr>
         <p:spPr>
           <a:xfrm flipV="1">
-            <a:off x="4220351" y="2453949"/>
-            <a:ext cx="256977" cy="306732"/>
+            <a:off x="6519029" y="2707130"/>
+            <a:ext cx="1193368" cy="717715"/>
           </a:xfrm>
           <a:prstGeom prst="bentConnector3">
-            <a:avLst>
-              <a:gd name="adj1" fmla="val 50000"/>
-            </a:avLst>
+            <a:avLst/>
           </a:prstGeom>
           <a:ln w="19050">
             <a:solidFill>
@@ -4453,14 +4648,14 @@
       </p:cxnSp>
       <p:sp>
         <p:nvSpPr>
-          <p:cNvPr id="62" name="Rectangle 8"/>
+          <p:cNvPr id="80" name="Rectangle 8"/>
           <p:cNvSpPr/>
           <p:nvPr/>
         </p:nvSpPr>
         <p:spPr>
           <a:xfrm>
-            <a:off x="6313677" y="2858066"/>
-            <a:ext cx="708186" cy="346760"/>
+            <a:off x="7712397" y="2887216"/>
+            <a:ext cx="708186" cy="285783"/>
           </a:xfrm>
           <a:prstGeom prst="rect">
             <a:avLst/>
@@ -4497,7 +4692,7 @@
                   <a:srgbClr val="7030A0"/>
                 </a:solidFill>
               </a:rPr>
-              <a:t>Person</a:t>
+              <a:t>Phone</a:t>
             </a:r>
             <a:endParaRPr lang="en-SG" sz="1050" dirty="0">
               <a:solidFill>
@@ -4507,64 +4702,19 @@
           </a:p>
         </p:txBody>
       </p:sp>
-      <p:sp>
-        <p:nvSpPr>
-          <p:cNvPr id="63" name="Flowchart: Decision 96"/>
-          <p:cNvSpPr/>
-          <p:nvPr/>
-        </p:nvSpPr>
-        <p:spPr>
-          <a:xfrm>
-            <a:off x="5643227" y="2943979"/>
-            <a:ext cx="236048" cy="173380"/>
-          </a:xfrm>
-          <a:prstGeom prst="flowChartDecision">
-            <a:avLst/>
-          </a:prstGeom>
-          <a:noFill/>
-          <a:ln w="19050">
-            <a:solidFill>
-              <a:srgbClr val="7030A0"/>
-            </a:solidFill>
-          </a:ln>
-          <a:effectLst/>
-        </p:spPr>
-        <p:style>
-          <a:lnRef idx="1">
-            <a:schemeClr val="accent6"/>
-          </a:lnRef>
-          <a:fillRef idx="2">
-            <a:schemeClr val="accent6"/>
-          </a:fillRef>
-          <a:effectRef idx="1">
-            <a:schemeClr val="accent6"/>
-          </a:effectRef>
-          <a:fontRef idx="minor">
-            <a:schemeClr val="dk1"/>
-          </a:fontRef>
-        </p:style>
-        <p:txBody>
-          <a:bodyPr rtlCol="0" anchor="ctr"/>
-          <a:lstStyle/>
-          <a:p>
-            <a:pPr algn="ctr"/>
-            <a:endParaRPr lang="en-US" sz="1050"/>
-          </a:p>
-        </p:txBody>
-      </p:sp>
       <p:cxnSp>
         <p:nvCxnSpPr>
-          <p:cNvPr id="64" name="Elbow Connector 63"/>
+          <p:cNvPr id="81" name="Elbow Connector 80"/>
           <p:cNvCxnSpPr>
-            <a:stCxn id="63" idx="3"/>
-            <a:endCxn id="62" idx="1"/>
+            <a:stCxn id="78" idx="3"/>
+            <a:endCxn id="80" idx="1"/>
           </p:cNvCxnSpPr>
           <p:nvPr/>
         </p:nvCxnSpPr>
         <p:spPr>
-          <a:xfrm>
-            <a:off x="5879275" y="3030669"/>
-            <a:ext cx="434402" cy="777"/>
+          <a:xfrm flipV="1">
+            <a:off x="6519029" y="3030108"/>
+            <a:ext cx="1193368" cy="394737"/>
           </a:xfrm>
           <a:prstGeom prst="bentConnector3">
             <a:avLst/>
@@ -4595,14 +4745,14 @@
       </p:cxnSp>
       <p:sp>
         <p:nvSpPr>
-          <p:cNvPr id="67" name="Rectangle 8"/>
+          <p:cNvPr id="83" name="Rectangle 8"/>
           <p:cNvSpPr/>
           <p:nvPr/>
         </p:nvSpPr>
         <p:spPr>
           <a:xfrm>
-            <a:off x="5336105" y="1809332"/>
-            <a:ext cx="483700" cy="346760"/>
+            <a:off x="7712397" y="3210194"/>
+            <a:ext cx="708186" cy="285783"/>
           </a:xfrm>
           <a:prstGeom prst="rect">
             <a:avLst/>
@@ -4639,7 +4789,7 @@
                   <a:srgbClr val="7030A0"/>
                 </a:solidFill>
               </a:rPr>
-              <a:t>Tag</a:t>
+              <a:t>Email</a:t>
             </a:r>
             <a:endParaRPr lang="en-SG" sz="1050" dirty="0">
               <a:solidFill>
@@ -4649,66 +4799,21 @@
           </a:p>
         </p:txBody>
       </p:sp>
-      <p:sp>
-        <p:nvSpPr>
-          <p:cNvPr id="68" name="Flowchart: Decision 96"/>
-          <p:cNvSpPr/>
-          <p:nvPr/>
-        </p:nvSpPr>
-        <p:spPr>
-          <a:xfrm rot="16200000">
-            <a:off x="4921666" y="2066540"/>
-            <a:ext cx="236048" cy="173380"/>
-          </a:xfrm>
-          <a:prstGeom prst="flowChartDecision">
-            <a:avLst/>
-          </a:prstGeom>
-          <a:noFill/>
-          <a:ln w="19050">
-            <a:solidFill>
-              <a:srgbClr val="7030A0"/>
-            </a:solidFill>
-          </a:ln>
-          <a:effectLst/>
-        </p:spPr>
-        <p:style>
-          <a:lnRef idx="1">
-            <a:schemeClr val="accent6"/>
-          </a:lnRef>
-          <a:fillRef idx="2">
-            <a:schemeClr val="accent6"/>
-          </a:fillRef>
-          <a:effectRef idx="1">
-            <a:schemeClr val="accent6"/>
-          </a:effectRef>
-          <a:fontRef idx="minor">
-            <a:schemeClr val="dk1"/>
-          </a:fontRef>
-        </p:style>
-        <p:txBody>
-          <a:bodyPr rtlCol="0" anchor="ctr"/>
-          <a:lstStyle/>
-          <a:p>
-            <a:pPr algn="ctr"/>
-            <a:endParaRPr lang="en-US" sz="1050"/>
-          </a:p>
-        </p:txBody>
-      </p:sp>
       <p:cxnSp>
         <p:nvCxnSpPr>
-          <p:cNvPr id="69" name="Elbow Connector 68"/>
+          <p:cNvPr id="84" name="Elbow Connector 83"/>
           <p:cNvCxnSpPr>
-            <a:stCxn id="68" idx="3"/>
-            <a:endCxn id="67" idx="1"/>
+            <a:stCxn id="78" idx="3"/>
+            <a:endCxn id="83" idx="1"/>
           </p:cNvCxnSpPr>
           <p:nvPr/>
         </p:nvCxnSpPr>
         <p:spPr>
-          <a:xfrm rot="5400000" flipH="1" flipV="1">
-            <a:off x="5161650" y="1860752"/>
-            <a:ext cx="52494" cy="296415"/>
-          </a:xfrm>
-          <a:prstGeom prst="bentConnector2">
+          <a:xfrm flipV="1">
+            <a:off x="6519029" y="3353086"/>
+            <a:ext cx="1193368" cy="71759"/>
+          </a:xfrm>
+          <a:prstGeom prst="bentConnector3">
             <a:avLst/>
           </a:prstGeom>
           <a:ln w="19050">
@@ -4737,14 +4842,14 @@
       </p:cxnSp>
       <p:sp>
         <p:nvSpPr>
-          <p:cNvPr id="72" name="Rectangle 8"/>
+          <p:cNvPr id="85" name="Rectangle 8"/>
           <p:cNvSpPr/>
           <p:nvPr/>
         </p:nvSpPr>
         <p:spPr>
           <a:xfrm>
-            <a:off x="5128257" y="3429000"/>
-            <a:ext cx="1156969" cy="346760"/>
+            <a:off x="7712397" y="3533171"/>
+            <a:ext cx="708186" cy="285783"/>
           </a:xfrm>
           <a:prstGeom prst="rect">
             <a:avLst/>
@@ -4781,415 +4886,6 @@
                   <a:srgbClr val="7030A0"/>
                 </a:solidFill>
               </a:rPr>
-              <a:t>&lt;&lt;interface&gt;&gt;</a:t>
-            </a:r>
-            <a:br>
-              <a:rPr lang="en-US" sz="1050" dirty="0" smtClean="0">
-                <a:solidFill>
-                  <a:srgbClr val="7030A0"/>
-                </a:solidFill>
-              </a:rPr>
-            </a:br>
-            <a:r>
-              <a:rPr lang="en-US" sz="1050" dirty="0" err="1" smtClean="0">
-                <a:solidFill>
-                  <a:srgbClr val="7030A0"/>
-                </a:solidFill>
-              </a:rPr>
-              <a:t>ReadOnlyPerson</a:t>
-            </a:r>
-            <a:endParaRPr lang="en-SG" sz="1050" dirty="0">
-              <a:solidFill>
-                <a:srgbClr val="7030A0"/>
-              </a:solidFill>
-            </a:endParaRPr>
-          </a:p>
-        </p:txBody>
-      </p:sp>
-      <p:sp>
-        <p:nvSpPr>
-          <p:cNvPr id="76" name="Rectangle 8"/>
-          <p:cNvSpPr/>
-          <p:nvPr/>
-        </p:nvSpPr>
-        <p:spPr>
-          <a:xfrm>
-            <a:off x="7712397" y="2564238"/>
-            <a:ext cx="708186" cy="285783"/>
-          </a:xfrm>
-          <a:prstGeom prst="rect">
-            <a:avLst/>
-          </a:prstGeom>
-          <a:ln w="19050">
-            <a:solidFill>
-              <a:srgbClr val="7030A0"/>
-            </a:solidFill>
-          </a:ln>
-          <a:effectLst/>
-        </p:spPr>
-        <p:style>
-          <a:lnRef idx="1">
-            <a:schemeClr val="accent4"/>
-          </a:lnRef>
-          <a:fillRef idx="2">
-            <a:schemeClr val="accent4"/>
-          </a:fillRef>
-          <a:effectRef idx="1">
-            <a:schemeClr val="accent4"/>
-          </a:effectRef>
-          <a:fontRef idx="minor">
-            <a:schemeClr val="dk1"/>
-          </a:fontRef>
-        </p:style>
-        <p:txBody>
-          <a:bodyPr rtlCol="0" anchor="ctr"/>
-          <a:lstStyle/>
-          <a:p>
-            <a:pPr algn="ctr"/>
-            <a:r>
-              <a:rPr lang="en-US" sz="1050" dirty="0" smtClean="0">
-                <a:solidFill>
-                  <a:srgbClr val="7030A0"/>
-                </a:solidFill>
-              </a:rPr>
-              <a:t>Name</a:t>
-            </a:r>
-            <a:endParaRPr lang="en-SG" sz="1050" dirty="0">
-              <a:solidFill>
-                <a:srgbClr val="7030A0"/>
-              </a:solidFill>
-            </a:endParaRPr>
-          </a:p>
-        </p:txBody>
-      </p:sp>
-      <p:sp>
-        <p:nvSpPr>
-          <p:cNvPr id="78" name="Flowchart: Decision 96"/>
-          <p:cNvSpPr/>
-          <p:nvPr/>
-        </p:nvSpPr>
-        <p:spPr>
-          <a:xfrm>
-            <a:off x="7041947" y="2948201"/>
-            <a:ext cx="236048" cy="173380"/>
-          </a:xfrm>
-          <a:prstGeom prst="flowChartDecision">
-            <a:avLst/>
-          </a:prstGeom>
-          <a:solidFill>
-            <a:srgbClr val="7030A0"/>
-          </a:solidFill>
-          <a:ln w="19050">
-            <a:solidFill>
-              <a:srgbClr val="7030A0"/>
-            </a:solidFill>
-          </a:ln>
-          <a:effectLst/>
-        </p:spPr>
-        <p:style>
-          <a:lnRef idx="1">
-            <a:schemeClr val="accent6"/>
-          </a:lnRef>
-          <a:fillRef idx="2">
-            <a:schemeClr val="accent6"/>
-          </a:fillRef>
-          <a:effectRef idx="1">
-            <a:schemeClr val="accent6"/>
-          </a:effectRef>
-          <a:fontRef idx="minor">
-            <a:schemeClr val="dk1"/>
-          </a:fontRef>
-        </p:style>
-        <p:txBody>
-          <a:bodyPr rtlCol="0" anchor="ctr"/>
-          <a:lstStyle/>
-          <a:p>
-            <a:pPr algn="ctr"/>
-            <a:endParaRPr lang="en-US" sz="1050"/>
-          </a:p>
-        </p:txBody>
-      </p:sp>
-      <p:cxnSp>
-        <p:nvCxnSpPr>
-          <p:cNvPr id="79" name="Elbow Connector 78"/>
-          <p:cNvCxnSpPr>
-            <a:stCxn id="78" idx="3"/>
-            <a:endCxn id="76" idx="1"/>
-          </p:cNvCxnSpPr>
-          <p:nvPr/>
-        </p:nvCxnSpPr>
-        <p:spPr>
-          <a:xfrm flipV="1">
-            <a:off x="7277995" y="2707130"/>
-            <a:ext cx="434402" cy="327761"/>
-          </a:xfrm>
-          <a:prstGeom prst="bentConnector3">
-            <a:avLst/>
-          </a:prstGeom>
-          <a:ln w="19050">
-            <a:solidFill>
-              <a:srgbClr val="7030A0"/>
-            </a:solidFill>
-            <a:headEnd type="none" w="med" len="med"/>
-            <a:tailEnd type="arrow" w="med" len="med"/>
-          </a:ln>
-          <a:effectLst/>
-        </p:spPr>
-        <p:style>
-          <a:lnRef idx="1">
-            <a:schemeClr val="accent2"/>
-          </a:lnRef>
-          <a:fillRef idx="2">
-            <a:schemeClr val="accent2"/>
-          </a:fillRef>
-          <a:effectRef idx="1">
-            <a:schemeClr val="accent2"/>
-          </a:effectRef>
-          <a:fontRef idx="minor">
-            <a:schemeClr val="dk1"/>
-          </a:fontRef>
-        </p:style>
-      </p:cxnSp>
-      <p:sp>
-        <p:nvSpPr>
-          <p:cNvPr id="80" name="Rectangle 8"/>
-          <p:cNvSpPr/>
-          <p:nvPr/>
-        </p:nvSpPr>
-        <p:spPr>
-          <a:xfrm>
-            <a:off x="7712397" y="2887216"/>
-            <a:ext cx="708186" cy="285783"/>
-          </a:xfrm>
-          <a:prstGeom prst="rect">
-            <a:avLst/>
-          </a:prstGeom>
-          <a:ln w="19050">
-            <a:solidFill>
-              <a:srgbClr val="7030A0"/>
-            </a:solidFill>
-          </a:ln>
-          <a:effectLst/>
-        </p:spPr>
-        <p:style>
-          <a:lnRef idx="1">
-            <a:schemeClr val="accent4"/>
-          </a:lnRef>
-          <a:fillRef idx="2">
-            <a:schemeClr val="accent4"/>
-          </a:fillRef>
-          <a:effectRef idx="1">
-            <a:schemeClr val="accent4"/>
-          </a:effectRef>
-          <a:fontRef idx="minor">
-            <a:schemeClr val="dk1"/>
-          </a:fontRef>
-        </p:style>
-        <p:txBody>
-          <a:bodyPr rtlCol="0" anchor="ctr"/>
-          <a:lstStyle/>
-          <a:p>
-            <a:pPr algn="ctr"/>
-            <a:r>
-              <a:rPr lang="en-US" sz="1050" dirty="0" smtClean="0">
-                <a:solidFill>
-                  <a:srgbClr val="7030A0"/>
-                </a:solidFill>
-              </a:rPr>
-              <a:t>Phone</a:t>
-            </a:r>
-            <a:endParaRPr lang="en-SG" sz="1050" dirty="0">
-              <a:solidFill>
-                <a:srgbClr val="7030A0"/>
-              </a:solidFill>
-            </a:endParaRPr>
-          </a:p>
-        </p:txBody>
-      </p:sp>
-      <p:cxnSp>
-        <p:nvCxnSpPr>
-          <p:cNvPr id="81" name="Elbow Connector 80"/>
-          <p:cNvCxnSpPr>
-            <a:stCxn id="78" idx="3"/>
-            <a:endCxn id="80" idx="1"/>
-          </p:cNvCxnSpPr>
-          <p:nvPr/>
-        </p:nvCxnSpPr>
-        <p:spPr>
-          <a:xfrm flipV="1">
-            <a:off x="7277995" y="3030108"/>
-            <a:ext cx="434402" cy="4783"/>
-          </a:xfrm>
-          <a:prstGeom prst="bentConnector3">
-            <a:avLst/>
-          </a:prstGeom>
-          <a:ln w="19050">
-            <a:solidFill>
-              <a:srgbClr val="7030A0"/>
-            </a:solidFill>
-            <a:headEnd type="none" w="med" len="med"/>
-            <a:tailEnd type="arrow" w="med" len="med"/>
-          </a:ln>
-          <a:effectLst/>
-        </p:spPr>
-        <p:style>
-          <a:lnRef idx="1">
-            <a:schemeClr val="accent2"/>
-          </a:lnRef>
-          <a:fillRef idx="2">
-            <a:schemeClr val="accent2"/>
-          </a:fillRef>
-          <a:effectRef idx="1">
-            <a:schemeClr val="accent2"/>
-          </a:effectRef>
-          <a:fontRef idx="minor">
-            <a:schemeClr val="dk1"/>
-          </a:fontRef>
-        </p:style>
-      </p:cxnSp>
-      <p:sp>
-        <p:nvSpPr>
-          <p:cNvPr id="83" name="Rectangle 8"/>
-          <p:cNvSpPr/>
-          <p:nvPr/>
-        </p:nvSpPr>
-        <p:spPr>
-          <a:xfrm>
-            <a:off x="7712397" y="3210194"/>
-            <a:ext cx="708186" cy="285783"/>
-          </a:xfrm>
-          <a:prstGeom prst="rect">
-            <a:avLst/>
-          </a:prstGeom>
-          <a:ln w="19050">
-            <a:solidFill>
-              <a:srgbClr val="7030A0"/>
-            </a:solidFill>
-          </a:ln>
-          <a:effectLst/>
-        </p:spPr>
-        <p:style>
-          <a:lnRef idx="1">
-            <a:schemeClr val="accent4"/>
-          </a:lnRef>
-          <a:fillRef idx="2">
-            <a:schemeClr val="accent4"/>
-          </a:fillRef>
-          <a:effectRef idx="1">
-            <a:schemeClr val="accent4"/>
-          </a:effectRef>
-          <a:fontRef idx="minor">
-            <a:schemeClr val="dk1"/>
-          </a:fontRef>
-        </p:style>
-        <p:txBody>
-          <a:bodyPr rtlCol="0" anchor="ctr"/>
-          <a:lstStyle/>
-          <a:p>
-            <a:pPr algn="ctr"/>
-            <a:r>
-              <a:rPr lang="en-US" sz="1050" dirty="0" smtClean="0">
-                <a:solidFill>
-                  <a:srgbClr val="7030A0"/>
-                </a:solidFill>
-              </a:rPr>
-              <a:t>Email</a:t>
-            </a:r>
-            <a:endParaRPr lang="en-SG" sz="1050" dirty="0">
-              <a:solidFill>
-                <a:srgbClr val="7030A0"/>
-              </a:solidFill>
-            </a:endParaRPr>
-          </a:p>
-        </p:txBody>
-      </p:sp>
-      <p:cxnSp>
-        <p:nvCxnSpPr>
-          <p:cNvPr id="84" name="Elbow Connector 83"/>
-          <p:cNvCxnSpPr>
-            <a:stCxn id="78" idx="3"/>
-            <a:endCxn id="83" idx="1"/>
-          </p:cNvCxnSpPr>
-          <p:nvPr/>
-        </p:nvCxnSpPr>
-        <p:spPr>
-          <a:xfrm>
-            <a:off x="7277995" y="3034891"/>
-            <a:ext cx="434402" cy="318195"/>
-          </a:xfrm>
-          <a:prstGeom prst="bentConnector3">
-            <a:avLst/>
-          </a:prstGeom>
-          <a:ln w="19050">
-            <a:solidFill>
-              <a:srgbClr val="7030A0"/>
-            </a:solidFill>
-            <a:headEnd type="none" w="med" len="med"/>
-            <a:tailEnd type="arrow" w="med" len="med"/>
-          </a:ln>
-          <a:effectLst/>
-        </p:spPr>
-        <p:style>
-          <a:lnRef idx="1">
-            <a:schemeClr val="accent2"/>
-          </a:lnRef>
-          <a:fillRef idx="2">
-            <a:schemeClr val="accent2"/>
-          </a:fillRef>
-          <a:effectRef idx="1">
-            <a:schemeClr val="accent2"/>
-          </a:effectRef>
-          <a:fontRef idx="minor">
-            <a:schemeClr val="dk1"/>
-          </a:fontRef>
-        </p:style>
-      </p:cxnSp>
-      <p:sp>
-        <p:nvSpPr>
-          <p:cNvPr id="85" name="Rectangle 8"/>
-          <p:cNvSpPr/>
-          <p:nvPr/>
-        </p:nvSpPr>
-        <p:spPr>
-          <a:xfrm>
-            <a:off x="7712397" y="3533171"/>
-            <a:ext cx="708186" cy="285783"/>
-          </a:xfrm>
-          <a:prstGeom prst="rect">
-            <a:avLst/>
-          </a:prstGeom>
-          <a:ln w="19050">
-            <a:solidFill>
-              <a:srgbClr val="7030A0"/>
-            </a:solidFill>
-          </a:ln>
-          <a:effectLst/>
-        </p:spPr>
-        <p:style>
-          <a:lnRef idx="1">
-            <a:schemeClr val="accent4"/>
-          </a:lnRef>
-          <a:fillRef idx="2">
-            <a:schemeClr val="accent4"/>
-          </a:fillRef>
-          <a:effectRef idx="1">
-            <a:schemeClr val="accent4"/>
-          </a:effectRef>
-          <a:fontRef idx="minor">
-            <a:schemeClr val="dk1"/>
-          </a:fontRef>
-        </p:style>
-        <p:txBody>
-          <a:bodyPr rtlCol="0" anchor="ctr"/>
-          <a:lstStyle/>
-          <a:p>
-            <a:pPr algn="ctr"/>
-            <a:r>
-              <a:rPr lang="en-US" sz="1050" dirty="0" smtClean="0">
-                <a:solidFill>
-                  <a:srgbClr val="7030A0"/>
-                </a:solidFill>
-              </a:rPr>
               <a:t>Address</a:t>
             </a:r>
             <a:endParaRPr lang="en-SG" sz="1050" dirty="0">
@@ -5211,8 +4907,8 @@
         </p:nvCxnSpPr>
         <p:spPr>
           <a:xfrm>
-            <a:off x="7277995" y="3034891"/>
-            <a:ext cx="434402" cy="641172"/>
+            <a:off x="6519029" y="3424845"/>
+            <a:ext cx="1193368" cy="251218"/>
           </a:xfrm>
           <a:prstGeom prst="bentConnector3">
             <a:avLst/>
@@ -5251,7 +4947,7 @@
         </p:nvCxnSpPr>
         <p:spPr>
           <a:xfrm rot="16200000" flipH="1">
-            <a:off x="3279321" y="2485431"/>
+            <a:off x="2520355" y="2875385"/>
             <a:ext cx="293825" cy="1"/>
           </a:xfrm>
           <a:prstGeom prst="bentConnector3">
@@ -5292,7 +4988,7 @@
         </p:nvSpPr>
         <p:spPr>
           <a:xfrm rot="10800000" flipV="1">
-            <a:off x="3290981" y="2162997"/>
+            <a:off x="2532015" y="2552951"/>
             <a:ext cx="270504" cy="175523"/>
           </a:xfrm>
           <a:prstGeom prst="triangle">
@@ -5340,7 +5036,7 @@
         </p:nvSpPr>
         <p:spPr>
           <a:xfrm>
-            <a:off x="2660303" y="1806470"/>
+            <a:off x="1901337" y="2196424"/>
             <a:ext cx="1539926" cy="346760"/>
           </a:xfrm>
           <a:prstGeom prst="rect">
@@ -5403,137 +5099,19 @@
           </a:p>
         </p:txBody>
       </p:sp>
-      <p:sp>
-        <p:nvSpPr>
-          <p:cNvPr id="114" name="TextBox 113"/>
-          <p:cNvSpPr txBox="1"/>
-          <p:nvPr/>
-        </p:nvSpPr>
-        <p:spPr>
-          <a:xfrm rot="16200000">
-            <a:off x="6527512" y="3586305"/>
-            <a:ext cx="881018" cy="261610"/>
-          </a:xfrm>
-          <a:prstGeom prst="rect">
-            <a:avLst/>
-          </a:prstGeom>
-          <a:noFill/>
-        </p:spPr>
-        <p:txBody>
-          <a:bodyPr wrap="square" rtlCol="0">
-            <a:spAutoFit/>
-          </a:bodyPr>
-          <a:lstStyle/>
-          <a:p>
-            <a:pPr algn="r"/>
-            <a:r>
-              <a:rPr lang="en-US" sz="1100" dirty="0" smtClean="0">
-                <a:solidFill>
-                  <a:srgbClr val="7030A0"/>
-                </a:solidFill>
-              </a:rPr>
-              <a:t>filtered list</a:t>
-            </a:r>
-            <a:endParaRPr lang="en-SG" sz="1100" dirty="0">
-              <a:solidFill>
-                <a:srgbClr val="7030A0"/>
-              </a:solidFill>
-            </a:endParaRPr>
-          </a:p>
-        </p:txBody>
-      </p:sp>
-      <p:sp>
-        <p:nvSpPr>
-          <p:cNvPr id="122" name="Rectangle 8"/>
-          <p:cNvSpPr/>
-          <p:nvPr/>
-        </p:nvSpPr>
-        <p:spPr>
-          <a:xfrm>
-            <a:off x="2057401" y="4239491"/>
-            <a:ext cx="1066800" cy="346760"/>
-          </a:xfrm>
-          <a:prstGeom prst="rect">
-            <a:avLst/>
-          </a:prstGeom>
-          <a:ln w="19050">
-            <a:solidFill>
-              <a:srgbClr val="7030A0"/>
-            </a:solidFill>
-          </a:ln>
-          <a:effectLst/>
-        </p:spPr>
-        <p:style>
-          <a:lnRef idx="1">
-            <a:schemeClr val="accent4"/>
-          </a:lnRef>
-          <a:fillRef idx="2">
-            <a:schemeClr val="accent4"/>
-          </a:fillRef>
-          <a:effectRef idx="1">
-            <a:schemeClr val="accent4"/>
-          </a:effectRef>
-          <a:fontRef idx="minor">
-            <a:schemeClr val="dk1"/>
-          </a:fontRef>
-        </p:style>
-        <p:txBody>
-          <a:bodyPr rtlCol="0" anchor="ctr"/>
-          <a:lstStyle/>
-          <a:p>
-            <a:pPr algn="ctr"/>
-            <a:r>
-              <a:rPr lang="en-US" sz="1050" dirty="0" smtClean="0">
-                <a:solidFill>
-                  <a:srgbClr val="7030A0"/>
-                </a:solidFill>
-              </a:rPr>
-              <a:t>&lt;&lt;interface&gt;&gt;</a:t>
-            </a:r>
-            <a:r>
-              <a:rPr lang="en-US" sz="1050">
-                <a:solidFill>
-                  <a:srgbClr val="7030A0"/>
-                </a:solidFill>
-              </a:rPr>
-              <a:t/>
-            </a:r>
-            <a:br>
-              <a:rPr lang="en-US" sz="1050">
-                <a:solidFill>
-                  <a:srgbClr val="7030A0"/>
-                </a:solidFill>
-              </a:rPr>
-            </a:br>
-            <a:r>
-              <a:rPr lang="en-US" sz="1050" dirty="0" err="1" smtClean="0">
-                <a:solidFill>
-                  <a:srgbClr val="7030A0"/>
-                </a:solidFill>
-              </a:rPr>
-              <a:t>ObservableList</a:t>
-            </a:r>
-            <a:endParaRPr lang="en-SG" sz="1050" dirty="0">
-              <a:solidFill>
-                <a:srgbClr val="7030A0"/>
-              </a:solidFill>
-            </a:endParaRPr>
-          </a:p>
-        </p:txBody>
-      </p:sp>
       <p:cxnSp>
         <p:nvCxnSpPr>
-          <p:cNvPr id="124" name="Elbow Connector 122"/>
+          <p:cNvPr id="50" name="Elbow Connector 49"/>
           <p:cNvCxnSpPr>
-            <a:stCxn id="119" idx="1"/>
-            <a:endCxn id="122" idx="1"/>
+            <a:stCxn id="62" idx="0"/>
+            <a:endCxn id="57" idx="3"/>
           </p:cNvCxnSpPr>
           <p:nvPr/>
         </p:nvCxnSpPr>
         <p:spPr>
-          <a:xfrm rot="16200000" flipH="1">
-            <a:off x="1364475" y="3719944"/>
-            <a:ext cx="831471" cy="554381"/>
+          <a:xfrm rot="16200000" flipV="1">
+            <a:off x="5190010" y="2529225"/>
+            <a:ext cx="404117" cy="1033473"/>
           </a:xfrm>
           <a:prstGeom prst="bentConnector2">
             <a:avLst/>
@@ -5542,7 +5120,6 @@
             <a:solidFill>
               <a:srgbClr val="7030A0"/>
             </a:solidFill>
-            <a:prstDash val="sysDot"/>
             <a:headEnd type="none" w="med" len="med"/>
             <a:tailEnd type="arrow" w="med" len="med"/>
           </a:ln>
@@ -5563,29 +5140,342 @@
           </a:fontRef>
         </p:style>
       </p:cxnSp>
-      <p:cxnSp>
-        <p:nvCxnSpPr>
-          <p:cNvPr id="50" name="Elbow Connector 49"/>
-          <p:cNvCxnSpPr>
-            <a:stCxn id="62" idx="0"/>
-            <a:endCxn id="57" idx="3"/>
-          </p:cNvCxnSpPr>
+      <p:sp>
+        <p:nvSpPr>
+          <p:cNvPr id="11" name="TextBox 10"/>
+          <p:cNvSpPr txBox="1"/>
           <p:nvPr/>
-        </p:nvCxnSpPr>
-        <p:spPr>
-          <a:xfrm rot="16200000" flipV="1">
-            <a:off x="5948976" y="2139271"/>
-            <a:ext cx="404117" cy="1033473"/>
-          </a:xfrm>
-          <a:prstGeom prst="bentConnector2">
+        </p:nvSpPr>
+        <p:spPr>
+          <a:xfrm>
+            <a:off x="3566006" y="2581182"/>
+            <a:ext cx="189257" cy="178683"/>
+          </a:xfrm>
+          <a:prstGeom prst="rect">
             <a:avLst/>
           </a:prstGeom>
+          <a:noFill/>
+        </p:spPr>
+        <p:txBody>
+          <a:bodyPr wrap="square" lIns="0" tIns="0" rIns="0" bIns="0" rtlCol="0">
+            <a:noAutofit/>
+          </a:bodyPr>
+          <a:lstStyle/>
+          <a:p>
+            <a:pPr algn="ctr"/>
+            <a:r>
+              <a:rPr lang="en-US" sz="1100" dirty="0" smtClean="0">
+                <a:solidFill>
+                  <a:srgbClr val="7030A0"/>
+                </a:solidFill>
+              </a:rPr>
+              <a:t>1</a:t>
+            </a:r>
+            <a:endParaRPr lang="en-SG" sz="1100" dirty="0">
+              <a:solidFill>
+                <a:srgbClr val="7030A0"/>
+              </a:solidFill>
+            </a:endParaRPr>
+          </a:p>
+        </p:txBody>
+      </p:sp>
+      <p:sp>
+        <p:nvSpPr>
+          <p:cNvPr id="54" name="TextBox 53"/>
+          <p:cNvSpPr txBox="1"/>
+          <p:nvPr/>
+        </p:nvSpPr>
+        <p:spPr>
+          <a:xfrm>
+            <a:off x="3566006" y="3448818"/>
+            <a:ext cx="189257" cy="178683"/>
+          </a:xfrm>
+          <a:prstGeom prst="rect">
+            <a:avLst/>
+          </a:prstGeom>
+          <a:noFill/>
+        </p:spPr>
+        <p:txBody>
+          <a:bodyPr wrap="square" lIns="0" tIns="0" rIns="0" bIns="0" rtlCol="0">
+            <a:noAutofit/>
+          </a:bodyPr>
+          <a:lstStyle/>
+          <a:p>
+            <a:pPr algn="ctr"/>
+            <a:r>
+              <a:rPr lang="en-US" sz="1100" dirty="0" smtClean="0">
+                <a:solidFill>
+                  <a:srgbClr val="7030A0"/>
+                </a:solidFill>
+              </a:rPr>
+              <a:t>1</a:t>
+            </a:r>
+            <a:endParaRPr lang="en-SG" sz="1100" dirty="0">
+              <a:solidFill>
+                <a:srgbClr val="7030A0"/>
+              </a:solidFill>
+            </a:endParaRPr>
+          </a:p>
+        </p:txBody>
+      </p:sp>
+      <p:sp>
+        <p:nvSpPr>
+          <p:cNvPr id="56" name="TextBox 55"/>
+          <p:cNvSpPr txBox="1"/>
+          <p:nvPr/>
+        </p:nvSpPr>
+        <p:spPr>
+          <a:xfrm>
+            <a:off x="4930795" y="2885367"/>
+            <a:ext cx="189257" cy="178683"/>
+          </a:xfrm>
+          <a:prstGeom prst="rect">
+            <a:avLst/>
+          </a:prstGeom>
+          <a:noFill/>
+        </p:spPr>
+        <p:txBody>
+          <a:bodyPr wrap="square" lIns="0" tIns="0" rIns="0" bIns="0" rtlCol="0">
+            <a:noAutofit/>
+          </a:bodyPr>
+          <a:lstStyle/>
+          <a:p>
+            <a:pPr algn="ctr"/>
+            <a:r>
+              <a:rPr lang="en-US" sz="1100" dirty="0" smtClean="0">
+                <a:solidFill>
+                  <a:srgbClr val="7030A0"/>
+                </a:solidFill>
+              </a:rPr>
+              <a:t>1</a:t>
+            </a:r>
+            <a:endParaRPr lang="en-SG" sz="1100" dirty="0">
+              <a:solidFill>
+                <a:srgbClr val="7030A0"/>
+              </a:solidFill>
+            </a:endParaRPr>
+          </a:p>
+        </p:txBody>
+      </p:sp>
+      <p:sp>
+        <p:nvSpPr>
+          <p:cNvPr id="60" name="TextBox 59"/>
+          <p:cNvSpPr txBox="1"/>
+          <p:nvPr/>
+        </p:nvSpPr>
+        <p:spPr>
+          <a:xfrm>
+            <a:off x="4404206" y="2168873"/>
+            <a:ext cx="189257" cy="178683"/>
+          </a:xfrm>
+          <a:prstGeom prst="rect">
+            <a:avLst/>
+          </a:prstGeom>
+          <a:noFill/>
+        </p:spPr>
+        <p:txBody>
+          <a:bodyPr wrap="square" lIns="0" tIns="0" rIns="0" bIns="0" rtlCol="0">
+            <a:noAutofit/>
+          </a:bodyPr>
+          <a:lstStyle/>
+          <a:p>
+            <a:pPr algn="ctr"/>
+            <a:r>
+              <a:rPr lang="en-US" sz="1100" dirty="0" smtClean="0">
+                <a:solidFill>
+                  <a:srgbClr val="7030A0"/>
+                </a:solidFill>
+              </a:rPr>
+              <a:t>*</a:t>
+            </a:r>
+            <a:endParaRPr lang="en-SG" sz="1100" dirty="0">
+              <a:solidFill>
+                <a:srgbClr val="7030A0"/>
+              </a:solidFill>
+            </a:endParaRPr>
+          </a:p>
+        </p:txBody>
+      </p:sp>
+      <p:sp>
+        <p:nvSpPr>
+          <p:cNvPr id="61" name="TextBox 60"/>
+          <p:cNvSpPr txBox="1"/>
+          <p:nvPr/>
+        </p:nvSpPr>
+        <p:spPr>
+          <a:xfrm>
+            <a:off x="5376290" y="3487871"/>
+            <a:ext cx="189257" cy="178683"/>
+          </a:xfrm>
+          <a:prstGeom prst="rect">
+            <a:avLst/>
+          </a:prstGeom>
+          <a:noFill/>
+        </p:spPr>
+        <p:txBody>
+          <a:bodyPr wrap="square" lIns="0" tIns="0" rIns="0" bIns="0" rtlCol="0">
+            <a:noAutofit/>
+          </a:bodyPr>
+          <a:lstStyle/>
+          <a:p>
+            <a:pPr algn="ctr"/>
+            <a:r>
+              <a:rPr lang="en-US" sz="1100" dirty="0" smtClean="0">
+                <a:solidFill>
+                  <a:srgbClr val="7030A0"/>
+                </a:solidFill>
+              </a:rPr>
+              <a:t>*</a:t>
+            </a:r>
+            <a:endParaRPr lang="en-SG" sz="1100" dirty="0">
+              <a:solidFill>
+                <a:srgbClr val="7030A0"/>
+              </a:solidFill>
+            </a:endParaRPr>
+          </a:p>
+        </p:txBody>
+      </p:sp>
+      <p:sp>
+        <p:nvSpPr>
+          <p:cNvPr id="65" name="TextBox 64"/>
+          <p:cNvSpPr txBox="1"/>
+          <p:nvPr/>
+        </p:nvSpPr>
+        <p:spPr>
+          <a:xfrm>
+            <a:off x="1928957" y="2954192"/>
+            <a:ext cx="189257" cy="178683"/>
+          </a:xfrm>
+          <a:prstGeom prst="rect">
+            <a:avLst/>
+          </a:prstGeom>
+          <a:noFill/>
+        </p:spPr>
+        <p:txBody>
+          <a:bodyPr wrap="square" lIns="0" tIns="0" rIns="0" bIns="0" rtlCol="0">
+            <a:noAutofit/>
+          </a:bodyPr>
+          <a:lstStyle/>
+          <a:p>
+            <a:pPr algn="ctr"/>
+            <a:r>
+              <a:rPr lang="en-US" sz="1100" dirty="0" smtClean="0">
+                <a:solidFill>
+                  <a:srgbClr val="7030A0"/>
+                </a:solidFill>
+              </a:rPr>
+              <a:t>1</a:t>
+            </a:r>
+            <a:endParaRPr lang="en-SG" sz="1100" dirty="0">
+              <a:solidFill>
+                <a:srgbClr val="7030A0"/>
+              </a:solidFill>
+            </a:endParaRPr>
+          </a:p>
+        </p:txBody>
+      </p:sp>
+      <p:sp>
+        <p:nvSpPr>
+          <p:cNvPr id="66" name="TextBox 65"/>
+          <p:cNvSpPr txBox="1"/>
+          <p:nvPr/>
+        </p:nvSpPr>
+        <p:spPr>
+          <a:xfrm>
+            <a:off x="1897404" y="3776004"/>
+            <a:ext cx="189257" cy="178683"/>
+          </a:xfrm>
+          <a:prstGeom prst="rect">
+            <a:avLst/>
+          </a:prstGeom>
+          <a:noFill/>
+        </p:spPr>
+        <p:txBody>
+          <a:bodyPr wrap="square" lIns="0" tIns="0" rIns="0" bIns="0" rtlCol="0">
+            <a:noAutofit/>
+          </a:bodyPr>
+          <a:lstStyle/>
+          <a:p>
+            <a:pPr algn="ctr"/>
+            <a:r>
+              <a:rPr lang="en-US" sz="1100" dirty="0" smtClean="0">
+                <a:solidFill>
+                  <a:srgbClr val="7030A0"/>
+                </a:solidFill>
+              </a:rPr>
+              <a:t>1</a:t>
+            </a:r>
+            <a:endParaRPr lang="en-SG" sz="1100" dirty="0">
+              <a:solidFill>
+                <a:srgbClr val="7030A0"/>
+              </a:solidFill>
+            </a:endParaRPr>
+          </a:p>
+        </p:txBody>
+      </p:sp>
+      <p:sp>
+        <p:nvSpPr>
+          <p:cNvPr id="70" name="TextBox 69"/>
+          <p:cNvSpPr txBox="1"/>
+          <p:nvPr/>
+        </p:nvSpPr>
+        <p:spPr>
+          <a:xfrm>
+            <a:off x="5908804" y="3600148"/>
+            <a:ext cx="189257" cy="178683"/>
+          </a:xfrm>
+          <a:prstGeom prst="rect">
+            <a:avLst/>
+          </a:prstGeom>
+          <a:noFill/>
+        </p:spPr>
+        <p:txBody>
+          <a:bodyPr wrap="square" lIns="0" tIns="0" rIns="0" bIns="0" rtlCol="0">
+            <a:noAutofit/>
+          </a:bodyPr>
+          <a:lstStyle/>
+          <a:p>
+            <a:pPr algn="ctr"/>
+            <a:r>
+              <a:rPr lang="en-US" sz="1100" dirty="0" smtClean="0">
+                <a:solidFill>
+                  <a:srgbClr val="7030A0"/>
+                </a:solidFill>
+              </a:rPr>
+              <a:t>1</a:t>
+            </a:r>
+            <a:endParaRPr lang="en-SG" sz="1100" dirty="0">
+              <a:solidFill>
+                <a:srgbClr val="7030A0"/>
+              </a:solidFill>
+            </a:endParaRPr>
+          </a:p>
+        </p:txBody>
+      </p:sp>
+      <p:sp>
+        <p:nvSpPr>
+          <p:cNvPr id="55" name="Rectangle 65"/>
+          <p:cNvSpPr/>
+          <p:nvPr/>
+        </p:nvSpPr>
+        <p:spPr>
+          <a:xfrm>
+            <a:off x="5097412" y="4324997"/>
+            <a:ext cx="3140716" cy="2997200"/>
+          </a:xfrm>
+          <a:prstGeom prst="roundRect">
+            <a:avLst>
+              <a:gd name="adj" fmla="val 3484"/>
+            </a:avLst>
+          </a:prstGeom>
+          <a:solidFill>
+            <a:schemeClr val="accent4">
+              <a:lumMod val="20000"/>
+              <a:lumOff val="80000"/>
+            </a:schemeClr>
+          </a:solidFill>
           <a:ln w="19050">
-            <a:solidFill>
-              <a:srgbClr val="7030A0"/>
-            </a:solidFill>
-            <a:headEnd type="none" w="med" len="med"/>
-            <a:tailEnd type="arrow" w="med" len="med"/>
+            <a:noFill/>
           </a:ln>
           <a:effectLst/>
         </p:spPr>
@@ -5603,312 +5493,11 @@
             <a:schemeClr val="dk1"/>
           </a:fontRef>
         </p:style>
-      </p:cxnSp>
-      <p:sp>
-        <p:nvSpPr>
-          <p:cNvPr id="11" name="TextBox 10"/>
-          <p:cNvSpPr txBox="1"/>
-          <p:nvPr/>
-        </p:nvSpPr>
-        <p:spPr>
-          <a:xfrm>
-            <a:off x="4324972" y="2191228"/>
-            <a:ext cx="189257" cy="178683"/>
-          </a:xfrm>
-          <a:prstGeom prst="rect">
-            <a:avLst/>
-          </a:prstGeom>
-          <a:noFill/>
-        </p:spPr>
-        <p:txBody>
-          <a:bodyPr wrap="square" lIns="0" tIns="0" rIns="0" bIns="0" rtlCol="0">
-            <a:noAutofit/>
-          </a:bodyPr>
-          <a:lstStyle/>
-          <a:p>
-            <a:pPr algn="ctr"/>
-            <a:r>
-              <a:rPr lang="en-US" sz="1100" dirty="0" smtClean="0">
-                <a:solidFill>
-                  <a:srgbClr val="7030A0"/>
-                </a:solidFill>
-              </a:rPr>
-              <a:t>1</a:t>
-            </a:r>
-            <a:endParaRPr lang="en-SG" sz="1100" dirty="0">
-              <a:solidFill>
-                <a:srgbClr val="7030A0"/>
-              </a:solidFill>
-            </a:endParaRPr>
-          </a:p>
-        </p:txBody>
-      </p:sp>
-      <p:sp>
-        <p:nvSpPr>
-          <p:cNvPr id="54" name="TextBox 53"/>
-          <p:cNvSpPr txBox="1"/>
-          <p:nvPr/>
-        </p:nvSpPr>
-        <p:spPr>
-          <a:xfrm>
-            <a:off x="4324972" y="3058864"/>
-            <a:ext cx="189257" cy="178683"/>
-          </a:xfrm>
-          <a:prstGeom prst="rect">
-            <a:avLst/>
-          </a:prstGeom>
-          <a:noFill/>
-        </p:spPr>
-        <p:txBody>
-          <a:bodyPr wrap="square" lIns="0" tIns="0" rIns="0" bIns="0" rtlCol="0">
-            <a:noAutofit/>
-          </a:bodyPr>
-          <a:lstStyle/>
-          <a:p>
-            <a:pPr algn="ctr"/>
-            <a:r>
-              <a:rPr lang="en-US" sz="1100" dirty="0" smtClean="0">
-                <a:solidFill>
-                  <a:srgbClr val="7030A0"/>
-                </a:solidFill>
-              </a:rPr>
-              <a:t>1</a:t>
-            </a:r>
-            <a:endParaRPr lang="en-SG" sz="1100" dirty="0">
-              <a:solidFill>
-                <a:srgbClr val="7030A0"/>
-              </a:solidFill>
-            </a:endParaRPr>
-          </a:p>
-        </p:txBody>
-      </p:sp>
-      <p:sp>
-        <p:nvSpPr>
-          <p:cNvPr id="56" name="TextBox 55"/>
-          <p:cNvSpPr txBox="1"/>
-          <p:nvPr/>
-        </p:nvSpPr>
-        <p:spPr>
-          <a:xfrm>
-            <a:off x="5689761" y="2495413"/>
-            <a:ext cx="189257" cy="178683"/>
-          </a:xfrm>
-          <a:prstGeom prst="rect">
-            <a:avLst/>
-          </a:prstGeom>
-          <a:noFill/>
-        </p:spPr>
-        <p:txBody>
-          <a:bodyPr wrap="square" lIns="0" tIns="0" rIns="0" bIns="0" rtlCol="0">
-            <a:noAutofit/>
-          </a:bodyPr>
-          <a:lstStyle/>
-          <a:p>
-            <a:pPr algn="ctr"/>
-            <a:r>
-              <a:rPr lang="en-US" sz="1100" dirty="0" smtClean="0">
-                <a:solidFill>
-                  <a:srgbClr val="7030A0"/>
-                </a:solidFill>
-              </a:rPr>
-              <a:t>1</a:t>
-            </a:r>
-            <a:endParaRPr lang="en-SG" sz="1100" dirty="0">
-              <a:solidFill>
-                <a:srgbClr val="7030A0"/>
-              </a:solidFill>
-            </a:endParaRPr>
-          </a:p>
-        </p:txBody>
-      </p:sp>
-      <p:sp>
-        <p:nvSpPr>
-          <p:cNvPr id="60" name="TextBox 59"/>
-          <p:cNvSpPr txBox="1"/>
-          <p:nvPr/>
-        </p:nvSpPr>
-        <p:spPr>
-          <a:xfrm>
-            <a:off x="5163172" y="1778919"/>
-            <a:ext cx="189257" cy="178683"/>
-          </a:xfrm>
-          <a:prstGeom prst="rect">
-            <a:avLst/>
-          </a:prstGeom>
-          <a:noFill/>
-        </p:spPr>
-        <p:txBody>
-          <a:bodyPr wrap="square" lIns="0" tIns="0" rIns="0" bIns="0" rtlCol="0">
-            <a:noAutofit/>
-          </a:bodyPr>
-          <a:lstStyle/>
-          <a:p>
-            <a:pPr algn="ctr"/>
-            <a:r>
-              <a:rPr lang="en-US" sz="1100" dirty="0" smtClean="0">
-                <a:solidFill>
-                  <a:srgbClr val="7030A0"/>
-                </a:solidFill>
-              </a:rPr>
-              <a:t>*</a:t>
-            </a:r>
-            <a:endParaRPr lang="en-SG" sz="1100" dirty="0">
-              <a:solidFill>
-                <a:srgbClr val="7030A0"/>
-              </a:solidFill>
-            </a:endParaRPr>
-          </a:p>
-        </p:txBody>
-      </p:sp>
-      <p:sp>
-        <p:nvSpPr>
-          <p:cNvPr id="61" name="TextBox 60"/>
-          <p:cNvSpPr txBox="1"/>
-          <p:nvPr/>
-        </p:nvSpPr>
-        <p:spPr>
-          <a:xfrm>
-            <a:off x="6135256" y="3097917"/>
-            <a:ext cx="189257" cy="178683"/>
-          </a:xfrm>
-          <a:prstGeom prst="rect">
-            <a:avLst/>
-          </a:prstGeom>
-          <a:noFill/>
-        </p:spPr>
-        <p:txBody>
-          <a:bodyPr wrap="square" lIns="0" tIns="0" rIns="0" bIns="0" rtlCol="0">
-            <a:noAutofit/>
-          </a:bodyPr>
-          <a:lstStyle/>
-          <a:p>
-            <a:pPr algn="ctr"/>
-            <a:r>
-              <a:rPr lang="en-US" sz="1100" dirty="0" smtClean="0">
-                <a:solidFill>
-                  <a:srgbClr val="7030A0"/>
-                </a:solidFill>
-              </a:rPr>
-              <a:t>*</a:t>
-            </a:r>
-            <a:endParaRPr lang="en-SG" sz="1100" dirty="0">
-              <a:solidFill>
-                <a:srgbClr val="7030A0"/>
-              </a:solidFill>
-            </a:endParaRPr>
-          </a:p>
-        </p:txBody>
-      </p:sp>
-      <p:sp>
-        <p:nvSpPr>
-          <p:cNvPr id="65" name="TextBox 64"/>
-          <p:cNvSpPr txBox="1"/>
-          <p:nvPr/>
-        </p:nvSpPr>
-        <p:spPr>
-          <a:xfrm>
-            <a:off x="2687923" y="2564238"/>
-            <a:ext cx="189257" cy="178683"/>
-          </a:xfrm>
-          <a:prstGeom prst="rect">
-            <a:avLst/>
-          </a:prstGeom>
-          <a:noFill/>
-        </p:spPr>
-        <p:txBody>
-          <a:bodyPr wrap="square" lIns="0" tIns="0" rIns="0" bIns="0" rtlCol="0">
-            <a:noAutofit/>
-          </a:bodyPr>
-          <a:lstStyle/>
-          <a:p>
-            <a:pPr algn="ctr"/>
-            <a:r>
-              <a:rPr lang="en-US" sz="1100" dirty="0" smtClean="0">
-                <a:solidFill>
-                  <a:srgbClr val="7030A0"/>
-                </a:solidFill>
-              </a:rPr>
-              <a:t>1</a:t>
-            </a:r>
-            <a:endParaRPr lang="en-SG" sz="1100" dirty="0">
-              <a:solidFill>
-                <a:srgbClr val="7030A0"/>
-              </a:solidFill>
-            </a:endParaRPr>
-          </a:p>
-        </p:txBody>
-      </p:sp>
-      <p:sp>
-        <p:nvSpPr>
-          <p:cNvPr id="66" name="TextBox 65"/>
-          <p:cNvSpPr txBox="1"/>
-          <p:nvPr/>
-        </p:nvSpPr>
-        <p:spPr>
-          <a:xfrm>
-            <a:off x="2656370" y="3386050"/>
-            <a:ext cx="189257" cy="178683"/>
-          </a:xfrm>
-          <a:prstGeom prst="rect">
-            <a:avLst/>
-          </a:prstGeom>
-          <a:noFill/>
-        </p:spPr>
-        <p:txBody>
-          <a:bodyPr wrap="square" lIns="0" tIns="0" rIns="0" bIns="0" rtlCol="0">
-            <a:noAutofit/>
-          </a:bodyPr>
-          <a:lstStyle/>
-          <a:p>
-            <a:pPr algn="ctr"/>
-            <a:r>
-              <a:rPr lang="en-US" sz="1100" dirty="0" smtClean="0">
-                <a:solidFill>
-                  <a:srgbClr val="7030A0"/>
-                </a:solidFill>
-              </a:rPr>
-              <a:t>1</a:t>
-            </a:r>
-            <a:endParaRPr lang="en-SG" sz="1100" dirty="0">
-              <a:solidFill>
-                <a:srgbClr val="7030A0"/>
-              </a:solidFill>
-            </a:endParaRPr>
-          </a:p>
-        </p:txBody>
-      </p:sp>
-      <p:sp>
-        <p:nvSpPr>
-          <p:cNvPr id="70" name="TextBox 69"/>
-          <p:cNvSpPr txBox="1"/>
-          <p:nvPr/>
-        </p:nvSpPr>
-        <p:spPr>
-          <a:xfrm>
-            <a:off x="6667770" y="3210194"/>
-            <a:ext cx="189257" cy="178683"/>
-          </a:xfrm>
-          <a:prstGeom prst="rect">
-            <a:avLst/>
-          </a:prstGeom>
-          <a:noFill/>
-        </p:spPr>
-        <p:txBody>
-          <a:bodyPr wrap="square" lIns="0" tIns="0" rIns="0" bIns="0" rtlCol="0">
-            <a:noAutofit/>
-          </a:bodyPr>
-          <a:lstStyle/>
-          <a:p>
-            <a:pPr algn="ctr"/>
-            <a:r>
-              <a:rPr lang="en-US" sz="1100" dirty="0" smtClean="0">
-                <a:solidFill>
-                  <a:srgbClr val="7030A0"/>
-                </a:solidFill>
-              </a:rPr>
-              <a:t>1</a:t>
-            </a:r>
-            <a:endParaRPr lang="en-SG" sz="1100" dirty="0">
+        <p:txBody>
+          <a:bodyPr rtlCol="0" anchor="t"/>
+          <a:lstStyle/>
+          <a:p>
+            <a:endParaRPr lang="en-SG" sz="1200" b="1" dirty="0">
               <a:solidFill>
                 <a:srgbClr val="7030A0"/>
               </a:solidFill>

</xml_diff>